<commit_message>
a missing command option
</commit_message>
<xml_diff>
--- a/cits1003-lecture_slides/CITS1003-C ExamExampleQ-exercises.pptx
+++ b/cits1003-lecture_slides/CITS1003-C ExamExampleQ-exercises.pptx
@@ -1571,7 +1571,7 @@
           <a:p>
             <a:fld id="{6D6D7260-B7E4-B548-BD1F-84ED14536037}" type="datetimeFigureOut">
               <a:rPr lang="en-AU" smtClean="0"/>
-              <a:t>15/05/2023</a:t>
+              <a:t>11/04/2024</a:t>
             </a:fld>
             <a:endParaRPr lang="en-AU"/>
           </a:p>
@@ -5724,7 +5724,7 @@
           <a:p>
             <a:fld id="{88D38747-4367-4BD2-8D51-C97E202738E2}" type="datetime1">
               <a:rPr lang="en-US" smtClean="0"/>
-              <a:t>5/15/2023</a:t>
+              <a:t>4/11/2024</a:t>
             </a:fld>
             <a:endParaRPr lang="en-US" dirty="0"/>
           </a:p>
@@ -6029,7 +6029,7 @@
           <a:p>
             <a:fld id="{11F1B079-7EF0-44EE-B798-BCC497C9F3B2}" type="datetime1">
               <a:rPr lang="en-US" smtClean="0"/>
-              <a:t>5/15/2023</a:t>
+              <a:t>4/11/2024</a:t>
             </a:fld>
             <a:endParaRPr lang="en-US" dirty="0"/>
           </a:p>
@@ -6223,7 +6223,7 @@
           <a:p>
             <a:fld id="{28FF70A8-1D13-4657-95F0-A9EA54967B8D}" type="datetime1">
               <a:rPr lang="en-US" smtClean="0"/>
-              <a:t>5/15/2023</a:t>
+              <a:t>4/11/2024</a:t>
             </a:fld>
             <a:endParaRPr lang="en-US" dirty="0"/>
           </a:p>
@@ -6486,7 +6486,7 @@
           <a:p>
             <a:fld id="{21EB90AC-71BD-4C7F-8ACA-7B3F18292E63}" type="datetime1">
               <a:rPr lang="en-US" smtClean="0"/>
-              <a:t>5/15/2023</a:t>
+              <a:t>4/11/2024</a:t>
             </a:fld>
             <a:endParaRPr lang="en-US" dirty="0"/>
           </a:p>
@@ -6922,7 +6922,7 @@
           <a:p>
             <a:fld id="{4E6EFC2C-8905-46F0-B443-CE905B76BA01}" type="datetime1">
               <a:rPr lang="en-US" smtClean="0"/>
-              <a:t>5/15/2023</a:t>
+              <a:t>4/11/2024</a:t>
             </a:fld>
             <a:endParaRPr lang="en-US" dirty="0"/>
           </a:p>
@@ -7459,7 +7459,7 @@
           <a:p>
             <a:fld id="{D9079DC3-C9B5-499E-9140-0DC28B7074E2}" type="datetime1">
               <a:rPr lang="en-US" smtClean="0"/>
-              <a:t>5/15/2023</a:t>
+              <a:t>4/11/2024</a:t>
             </a:fld>
             <a:endParaRPr lang="en-US" dirty="0"/>
           </a:p>
@@ -8341,7 +8341,7 @@
           <a:p>
             <a:fld id="{30BB33EA-E472-4D22-9C03-A9C14AA21CED}" type="datetime1">
               <a:rPr lang="en-US" smtClean="0"/>
-              <a:t>5/15/2023</a:t>
+              <a:t>4/11/2024</a:t>
             </a:fld>
             <a:endParaRPr lang="en-US" dirty="0"/>
           </a:p>
@@ -8511,7 +8511,7 @@
           <a:p>
             <a:fld id="{217E833E-1B6D-415F-AD29-75AE8C43BD0D}" type="datetime1">
               <a:rPr lang="en-US" smtClean="0"/>
-              <a:t>5/15/2023</a:t>
+              <a:t>4/11/2024</a:t>
             </a:fld>
             <a:endParaRPr lang="en-US" dirty="0"/>
           </a:p>
@@ -8695,7 +8695,7 @@
           <a:p>
             <a:fld id="{8452596F-08A7-4B70-989A-F2B1CF31E66B}" type="datetime1">
               <a:rPr lang="en-US" smtClean="0"/>
-              <a:t>5/15/2023</a:t>
+              <a:t>4/11/2024</a:t>
             </a:fld>
             <a:endParaRPr lang="en-US" dirty="0"/>
           </a:p>
@@ -8865,7 +8865,7 @@
           <a:p>
             <a:fld id="{73C55A3C-5767-4844-A0A3-83778C2E5409}" type="datetime1">
               <a:rPr lang="en-US" smtClean="0"/>
-              <a:t>5/15/2023</a:t>
+              <a:t>4/11/2024</a:t>
             </a:fld>
             <a:endParaRPr lang="en-US" dirty="0"/>
           </a:p>
@@ -9109,7 +9109,7 @@
           <a:p>
             <a:fld id="{CAE507A8-A5CF-4D38-AB86-7EDDA87A85D4}" type="datetime1">
               <a:rPr lang="en-US" smtClean="0"/>
-              <a:t>5/15/2023</a:t>
+              <a:t>4/11/2024</a:t>
             </a:fld>
             <a:endParaRPr lang="en-US" dirty="0"/>
           </a:p>
@@ -9351,7 +9351,7 @@
           <a:p>
             <a:fld id="{BDFCD27C-8599-43EF-BA1D-14DDC1946E06}" type="datetime1">
               <a:rPr lang="en-US" smtClean="0"/>
-              <a:t>5/15/2023</a:t>
+              <a:t>4/11/2024</a:t>
             </a:fld>
             <a:endParaRPr lang="en-US" dirty="0"/>
           </a:p>
@@ -9832,7 +9832,7 @@
           <a:p>
             <a:fld id="{49343D99-809A-49C0-96E5-4250D0B498EE}" type="datetime1">
               <a:rPr lang="en-US" smtClean="0"/>
-              <a:t>5/15/2023</a:t>
+              <a:t>4/11/2024</a:t>
             </a:fld>
             <a:endParaRPr lang="en-US" dirty="0"/>
           </a:p>
@@ -9950,7 +9950,7 @@
           <a:p>
             <a:fld id="{A143DE9B-B678-4EFB-BB7D-A4370204A0B0}" type="datetime1">
               <a:rPr lang="en-US" smtClean="0"/>
-              <a:t>5/15/2023</a:t>
+              <a:t>4/11/2024</a:t>
             </a:fld>
             <a:endParaRPr lang="en-US" dirty="0"/>
           </a:p>
@@ -10045,7 +10045,7 @@
           <a:p>
             <a:fld id="{E68812DA-F765-4142-A6A3-A8ED7235E082}" type="datetime1">
               <a:rPr lang="en-US" smtClean="0"/>
-              <a:t>5/15/2023</a:t>
+              <a:t>4/11/2024</a:t>
             </a:fld>
             <a:endParaRPr lang="en-US" dirty="0"/>
           </a:p>
@@ -10300,7 +10300,7 @@
           <a:p>
             <a:fld id="{3E0277FD-7DE6-41D4-930D-AC99F5AFE54E}" type="datetime1">
               <a:rPr lang="en-US" smtClean="0"/>
-              <a:t>5/15/2023</a:t>
+              <a:t>4/11/2024</a:t>
             </a:fld>
             <a:endParaRPr lang="en-US" dirty="0"/>
           </a:p>
@@ -10607,7 +10607,7 @@
           <a:p>
             <a:fld id="{9EA15526-7079-4B7B-987C-1B5FAE11A0FF}" type="datetime1">
               <a:rPr lang="en-US" smtClean="0"/>
-              <a:t>5/15/2023</a:t>
+              <a:t>4/11/2024</a:t>
             </a:fld>
             <a:endParaRPr lang="en-US" dirty="0"/>
           </a:p>
@@ -10842,7 +10842,7 @@
           <a:p>
             <a:fld id="{073ED0CC-082F-4160-86E5-0D6041F12778}" type="datetime1">
               <a:rPr lang="en-US" smtClean="0"/>
-              <a:t>5/15/2023</a:t>
+              <a:t>4/11/2024</a:t>
             </a:fld>
             <a:endParaRPr lang="en-US" dirty="0"/>
           </a:p>
@@ -11753,7 +11753,7 @@
           </a:effectLst>
           <a:extLst>
             <a:ext uri="{91240B29-F687-4f45-9708-019B960494DF}">
-              <a14:hiddenLine xmlns="" xmlns:a14="http://schemas.microsoft.com/office/drawing/2010/main" xmlns:p14="http://schemas.microsoft.com/office/powerpoint/2010/main" xmlns:a16="http://schemas.microsoft.com/office/drawing/2014/main" w="9525">
+              <a14:hiddenLine xmlns:a16="http://schemas.microsoft.com/office/drawing/2014/main" xmlns:p14="http://schemas.microsoft.com/office/powerpoint/2010/main" xmlns:a14="http://schemas.microsoft.com/office/drawing/2010/main" xmlns="" w="9525">
                 <a:solidFill>
                   <a:srgbClr val="000000"/>
                 </a:solidFill>
@@ -14783,7 +14783,7 @@
                   </a:outerShdw>
                 </a:effectLst>
               </a:rPr>
-              <a:t>c) [2 marks] Write a command to find all files that starts with the string "host" (e.g., host123.txt, </a:t>
+              <a:t>c) [2 marks] Write a command to find all files that start with the string "host" (e.g., host123.txt, </a:t>
             </a:r>
             <a:r>
               <a:rPr lang="en-AU" sz="2800" dirty="0" err="1">
@@ -14831,7 +14831,7 @@
                   </a:outerShdw>
                 </a:effectLst>
               </a:rPr>
-              <a:t>, hostname etc.) located in the currently logged-in user’s home directory.</a:t>
+              <a:t>, hostname, etc.) located in the currently logged-in user’s home directory.</a:t>
             </a:r>
           </a:p>
           <a:p>
@@ -14880,7 +14880,7 @@
                 <a:effectLst/>
                 <a:ea typeface="Times New Roman" panose="02020603050405020304" pitchFamily="18" charset="0"/>
               </a:rPr>
-              <a:t>find ~/ -name 'host*'</a:t>
+              <a:t>find ~/ -type f -name 'host*'</a:t>
             </a:r>
             <a:endParaRPr lang="en-AU" sz="2800" dirty="0">
               <a:effectLst/>

</xml_diff>